<commit_message>
Ajout d'un DNS et d'un serveur proxy, passage en HTTPS aussi
</commit_message>
<xml_diff>
--- a/BDD/Présentation/BDD.pptx
+++ b/BDD/Présentation/BDD.pptx
@@ -227,7 +227,7 @@
           <a:p>
             <a:fld id="{4779D249-8546-44E7-AFF9-C33297DBE209}" type="datetimeFigureOut">
               <a:rPr lang="fr-FR" smtClean="0"/>
-              <a:t>30/04/2025</a:t>
+              <a:t>05/05/2025</a:t>
             </a:fld>
             <a:endParaRPr lang="fr-FR"/>
           </a:p>
@@ -725,7 +725,7 @@
           <a:p>
             <a:fld id="{05702AA5-72B7-4A6D-AE87-75ED719B5BC0}" type="datetime1">
               <a:rPr lang="fr-FR" smtClean="0"/>
-              <a:t>30/04/2025</a:t>
+              <a:t>05/05/2025</a:t>
             </a:fld>
             <a:endParaRPr lang="fr-FR"/>
           </a:p>
@@ -923,7 +923,7 @@
           <a:p>
             <a:fld id="{D197E927-77B9-41D8-B0F5-21A8837484C9}" type="datetime1">
               <a:rPr lang="fr-FR" smtClean="0"/>
-              <a:t>30/04/2025</a:t>
+              <a:t>05/05/2025</a:t>
             </a:fld>
             <a:endParaRPr lang="fr-FR"/>
           </a:p>
@@ -1131,7 +1131,7 @@
           <a:p>
             <a:fld id="{A28BDB44-ADD5-4177-9ED5-22D818CD2632}" type="datetime1">
               <a:rPr lang="fr-FR" smtClean="0"/>
-              <a:t>30/04/2025</a:t>
+              <a:t>05/05/2025</a:t>
             </a:fld>
             <a:endParaRPr lang="fr-FR"/>
           </a:p>
@@ -1329,7 +1329,7 @@
           <a:p>
             <a:fld id="{761B89AB-9FF4-4AE2-83E5-42527AEDEA01}" type="datetime1">
               <a:rPr lang="fr-FR" smtClean="0"/>
-              <a:t>30/04/2025</a:t>
+              <a:t>05/05/2025</a:t>
             </a:fld>
             <a:endParaRPr lang="fr-FR"/>
           </a:p>
@@ -1604,7 +1604,7 @@
           <a:p>
             <a:fld id="{7ABD409A-4F23-4C83-89DD-56A83AB76E94}" type="datetime1">
               <a:rPr lang="fr-FR" smtClean="0"/>
-              <a:t>30/04/2025</a:t>
+              <a:t>05/05/2025</a:t>
             </a:fld>
             <a:endParaRPr lang="fr-FR"/>
           </a:p>
@@ -1869,7 +1869,7 @@
           <a:p>
             <a:fld id="{E24B19E2-A749-41D2-95DF-6D7D2722C851}" type="datetime1">
               <a:rPr lang="fr-FR" smtClean="0"/>
-              <a:t>30/04/2025</a:t>
+              <a:t>05/05/2025</a:t>
             </a:fld>
             <a:endParaRPr lang="fr-FR"/>
           </a:p>
@@ -2281,7 +2281,7 @@
           <a:p>
             <a:fld id="{54DE064F-849E-4709-8DA7-C3EAA9A8B073}" type="datetime1">
               <a:rPr lang="fr-FR" smtClean="0"/>
-              <a:t>30/04/2025</a:t>
+              <a:t>05/05/2025</a:t>
             </a:fld>
             <a:endParaRPr lang="fr-FR"/>
           </a:p>
@@ -2422,7 +2422,7 @@
           <a:p>
             <a:fld id="{672B1734-BD03-438F-817A-6C16F05BF363}" type="datetime1">
               <a:rPr lang="fr-FR" smtClean="0"/>
-              <a:t>30/04/2025</a:t>
+              <a:t>05/05/2025</a:t>
             </a:fld>
             <a:endParaRPr lang="fr-FR"/>
           </a:p>
@@ -2535,7 +2535,7 @@
           <a:p>
             <a:fld id="{5C81EC73-767D-4FBD-8398-75ACE66CE452}" type="datetime1">
               <a:rPr lang="fr-FR" smtClean="0"/>
-              <a:t>30/04/2025</a:t>
+              <a:t>05/05/2025</a:t>
             </a:fld>
             <a:endParaRPr lang="fr-FR"/>
           </a:p>
@@ -2846,7 +2846,7 @@
           <a:p>
             <a:fld id="{AAFA56B2-3115-44FA-8F0D-7EBC71A0585E}" type="datetime1">
               <a:rPr lang="fr-FR" smtClean="0"/>
-              <a:t>30/04/2025</a:t>
+              <a:t>05/05/2025</a:t>
             </a:fld>
             <a:endParaRPr lang="fr-FR"/>
           </a:p>
@@ -3134,7 +3134,7 @@
           <a:p>
             <a:fld id="{C59B1748-E56C-44D4-A80C-11917019A6AE}" type="datetime1">
               <a:rPr lang="fr-FR" smtClean="0"/>
-              <a:t>30/04/2025</a:t>
+              <a:t>05/05/2025</a:t>
             </a:fld>
             <a:endParaRPr lang="fr-FR"/>
           </a:p>
@@ -3375,7 +3375,7 @@
           <a:p>
             <a:fld id="{4291F839-4F38-4918-ABCC-24202926B045}" type="datetime1">
               <a:rPr lang="fr-FR" smtClean="0"/>
-              <a:t>30/04/2025</a:t>
+              <a:t>05/05/2025</a:t>
             </a:fld>
             <a:endParaRPr lang="fr-FR"/>
           </a:p>
@@ -5935,7 +5935,7 @@
             <p:ph idx="1"/>
             <p:extLst>
               <p:ext uri="{D42A27DB-BD31-4B8C-83A1-F6EECF244321}">
-                <p14:modId xmlns:p14="http://schemas.microsoft.com/office/powerpoint/2010/main" val="2807030077"/>
+                <p14:modId xmlns:p14="http://schemas.microsoft.com/office/powerpoint/2010/main" val="2970702872"/>
               </p:ext>
             </p:extLst>
           </p:nvPr>
@@ -6115,7 +6115,7 @@
                       <a:pPr algn="ctr"/>
                       <a:r>
                         <a:rPr lang="fr-FR" dirty="0"/>
-                        <a:t>Afficher les informations liées à l’utilisateur</a:t>
+                        <a:t>-</a:t>
                       </a:r>
                     </a:p>
                   </a:txBody>
@@ -7032,14 +7032,14 @@
             <p:ph idx="1"/>
             <p:extLst>
               <p:ext uri="{D42A27DB-BD31-4B8C-83A1-F6EECF244321}">
-                <p14:modId xmlns:p14="http://schemas.microsoft.com/office/powerpoint/2010/main" val="2755052326"/>
+                <p14:modId xmlns:p14="http://schemas.microsoft.com/office/powerpoint/2010/main" val="841394624"/>
               </p:ext>
             </p:extLst>
           </p:nvPr>
         </p:nvGraphicFramePr>
         <p:xfrm>
           <a:off x="4184987" y="1622433"/>
-          <a:ext cx="7743360" cy="3246423"/>
+          <a:ext cx="7743360" cy="3520743"/>
         </p:xfrm>
         <a:graphic>
           <a:graphicData uri="http://schemas.openxmlformats.org/drawingml/2006/table">
@@ -7212,7 +7212,7 @@
                       <a:pPr algn="ctr"/>
                       <a:r>
                         <a:rPr lang="fr-FR" dirty="0"/>
-                        <a:t>-</a:t>
+                        <a:t>Afficher les informations liées à l’utilisateur</a:t>
                       </a:r>
                     </a:p>
                   </a:txBody>
@@ -23913,6 +23913,15 @@
 </file>
 
 <file path=customXml/item2.xml><?xml version="1.0" encoding="utf-8"?>
+<?mso-contentType ?>
+<FormTemplates xmlns="http://schemas.microsoft.com/sharepoint/v3/contenttype/forms">
+  <Display>DocumentLibraryForm</Display>
+  <Edit>DocumentLibraryForm</Edit>
+  <New>DocumentLibraryForm</New>
+</FormTemplates>
+</file>
+
+<file path=customXml/item3.xml><?xml version="1.0" encoding="utf-8"?>
 <ct:contentTypeSchema xmlns:ct="http://schemas.microsoft.com/office/2006/metadata/contentType" xmlns:ma="http://schemas.microsoft.com/office/2006/metadata/properties/metaAttributes" ct:_="" ma:_="" ma:contentTypeName="Document" ma:contentTypeID="0x01010094021499A5C95A40AF8686382A9EB10F" ma:contentTypeVersion="5" ma:contentTypeDescription="Crée un document." ma:contentTypeScope="" ma:versionID="5a2004495cc74076c931264a0a56df36">
   <xsd:schema xmlns:xsd="http://www.w3.org/2001/XMLSchema" xmlns:xs="http://www.w3.org/2001/XMLSchema" xmlns:p="http://schemas.microsoft.com/office/2006/metadata/properties" xmlns:ns3="e207c133-0867-48c2-98bb-3cdd52f2ba59" targetNamespace="http://schemas.microsoft.com/office/2006/metadata/properties" ma:root="true" ma:fieldsID="cb70e895b990eb29a284cb2e15618dfa" ns3:_="">
     <xsd:import namespace="e207c133-0867-48c2-98bb-3cdd52f2ba59"/>
@@ -24062,15 +24071,6 @@
 </ct:contentTypeSchema>
 </file>
 
-<file path=customXml/item3.xml><?xml version="1.0" encoding="utf-8"?>
-<?mso-contentType ?>
-<FormTemplates xmlns="http://schemas.microsoft.com/sharepoint/v3/contenttype/forms">
-  <Display>DocumentLibraryForm</Display>
-  <Edit>DocumentLibraryForm</Edit>
-  <New>DocumentLibraryForm</New>
-</FormTemplates>
-</file>
-
 <file path=customXml/itemProps1.xml><?xml version="1.0" encoding="utf-8"?>
 <ds:datastoreItem xmlns:ds="http://schemas.openxmlformats.org/officeDocument/2006/customXml" ds:itemID="{0279B6FF-F878-4CA5-9497-D69AC8CC49BB}">
   <ds:schemaRefs>
@@ -24088,6 +24088,14 @@
 </file>
 
 <file path=customXml/itemProps2.xml><?xml version="1.0" encoding="utf-8"?>
+<ds:datastoreItem xmlns:ds="http://schemas.openxmlformats.org/officeDocument/2006/customXml" ds:itemID="{B54E04FC-41E1-44F8-B308-8921E8C7BE88}">
+  <ds:schemaRefs>
+    <ds:schemaRef ds:uri="http://schemas.microsoft.com/sharepoint/v3/contenttype/forms"/>
+  </ds:schemaRefs>
+</ds:datastoreItem>
+</file>
+
+<file path=customXml/itemProps3.xml><?xml version="1.0" encoding="utf-8"?>
 <ds:datastoreItem xmlns:ds="http://schemas.openxmlformats.org/officeDocument/2006/customXml" ds:itemID="{1DC5E58B-8A57-4515-AD75-560F0D9AC92D}">
   <ds:schemaRefs>
     <ds:schemaRef ds:uri="http://schemas.microsoft.com/office/2006/metadata/contentType"/>
@@ -24103,12 +24111,4 @@
     <ds:schemaRef ds:uri="http://schemas.microsoft.com/internal/obd"/>
   </ds:schemaRefs>
 </ds:datastoreItem>
-</file>
-
-<file path=customXml/itemProps3.xml><?xml version="1.0" encoding="utf-8"?>
-<ds:datastoreItem xmlns:ds="http://schemas.openxmlformats.org/officeDocument/2006/customXml" ds:itemID="{B54E04FC-41E1-44F8-B308-8921E8C7BE88}">
-  <ds:schemaRefs>
-    <ds:schemaRef ds:uri="http://schemas.microsoft.com/sharepoint/v3/contenttype/forms"/>
-  </ds:schemaRefs>
-</ds:datastoreItem>
 </file>
</xml_diff>